<commit_message>
add auto captions FT case
</commit_message>
<xml_diff>
--- a/doc/test/AutoCaptions.pptx
+++ b/doc/test/AutoCaptions.pptx
@@ -14,7 +14,7 @@
     <p:sldId id="256" r:id="rId5"/>
     <p:sldId id="292" r:id="rId6"/>
     <p:sldId id="294" r:id="rId7"/>
-    <p:sldId id="295" r:id="rId8"/>
+    <p:sldId id="296" r:id="rId8"/>
     <p:sldId id="274" r:id="rId9"/>
   </p:sldIdLst>
   <p:sldSz cx="9144000" cy="6858000" type="screen4x3"/>
@@ -127,7 +127,7 @@
             <p14:sldId id="256"/>
             <p14:sldId id="292"/>
             <p14:sldId id="294"/>
-            <p14:sldId id="295"/>
+            <p14:sldId id="296"/>
             <p14:sldId id="274"/>
           </p14:sldIdLst>
         </p14:section>
@@ -233,7 +233,7 @@
           <a:p>
             <a:fld id="{26004F41-C1A1-4B0D-9EEE-5E3F0E5BC108}" type="datetimeFigureOut">
               <a:rPr lang="en-SG" smtClean="0"/>
-              <a:t>26/3/2014</a:t>
+              <a:t>11/6/2015</a:t>
             </a:fld>
             <a:endParaRPr lang="en-SG"/>
           </a:p>
@@ -801,7 +801,7 @@
     </p:spTree>
     <p:extLst>
       <p:ext uri="{BB962C8B-B14F-4D97-AF65-F5344CB8AC3E}">
-        <p14:creationId xmlns:p14="http://schemas.microsoft.com/office/powerpoint/2010/main" val="2769902908"/>
+        <p14:creationId xmlns:p14="http://schemas.microsoft.com/office/powerpoint/2010/main" val="3539953974"/>
       </p:ext>
     </p:extLst>
   </p:cSld>
@@ -992,7 +992,7 @@
           <a:p>
             <a:fld id="{699DC775-C286-4358-8C92-D7E584E969B3}" type="datetimeFigureOut">
               <a:rPr lang="en-US" smtClean="0"/>
-              <a:t>3/26/2014</a:t>
+              <a:t>6/11/2015</a:t>
             </a:fld>
             <a:endParaRPr lang="en-US"/>
           </a:p>
@@ -1162,7 +1162,7 @@
           <a:p>
             <a:fld id="{699DC775-C286-4358-8C92-D7E584E969B3}" type="datetimeFigureOut">
               <a:rPr lang="en-US" smtClean="0"/>
-              <a:t>3/26/2014</a:t>
+              <a:t>6/11/2015</a:t>
             </a:fld>
             <a:endParaRPr lang="en-US"/>
           </a:p>
@@ -1342,7 +1342,7 @@
           <a:p>
             <a:fld id="{699DC775-C286-4358-8C92-D7E584E969B3}" type="datetimeFigureOut">
               <a:rPr lang="en-US" smtClean="0"/>
-              <a:t>3/26/2014</a:t>
+              <a:t>6/11/2015</a:t>
             </a:fld>
             <a:endParaRPr lang="en-US"/>
           </a:p>
@@ -1584,7 +1584,7 @@
           <a:p>
             <a:fld id="{699DC775-C286-4358-8C92-D7E584E969B3}" type="datetimeFigureOut">
               <a:rPr lang="en-US" smtClean="0"/>
-              <a:t>3/26/2014</a:t>
+              <a:t>6/11/2015</a:t>
             </a:fld>
             <a:endParaRPr lang="en-US"/>
           </a:p>
@@ -1754,7 +1754,7 @@
           <a:p>
             <a:fld id="{699DC775-C286-4358-8C92-D7E584E969B3}" type="datetimeFigureOut">
               <a:rPr lang="en-US" smtClean="0"/>
-              <a:t>3/26/2014</a:t>
+              <a:t>6/11/2015</a:t>
             </a:fld>
             <a:endParaRPr lang="en-US"/>
           </a:p>
@@ -2000,7 +2000,7 @@
           <a:p>
             <a:fld id="{699DC775-C286-4358-8C92-D7E584E969B3}" type="datetimeFigureOut">
               <a:rPr lang="en-US" smtClean="0"/>
-              <a:t>3/26/2014</a:t>
+              <a:t>6/11/2015</a:t>
             </a:fld>
             <a:endParaRPr lang="en-US"/>
           </a:p>
@@ -2288,7 +2288,7 @@
           <a:p>
             <a:fld id="{699DC775-C286-4358-8C92-D7E584E969B3}" type="datetimeFigureOut">
               <a:rPr lang="en-US" smtClean="0"/>
-              <a:t>3/26/2014</a:t>
+              <a:t>6/11/2015</a:t>
             </a:fld>
             <a:endParaRPr lang="en-US"/>
           </a:p>
@@ -2710,7 +2710,7 @@
           <a:p>
             <a:fld id="{699DC775-C286-4358-8C92-D7E584E969B3}" type="datetimeFigureOut">
               <a:rPr lang="en-US" smtClean="0"/>
-              <a:t>3/26/2014</a:t>
+              <a:t>6/11/2015</a:t>
             </a:fld>
             <a:endParaRPr lang="en-US"/>
           </a:p>
@@ -2828,7 +2828,7 @@
           <a:p>
             <a:fld id="{699DC775-C286-4358-8C92-D7E584E969B3}" type="datetimeFigureOut">
               <a:rPr lang="en-US" smtClean="0"/>
-              <a:t>3/26/2014</a:t>
+              <a:t>6/11/2015</a:t>
             </a:fld>
             <a:endParaRPr lang="en-US"/>
           </a:p>
@@ -2923,7 +2923,7 @@
           <a:p>
             <a:fld id="{699DC775-C286-4358-8C92-D7E584E969B3}" type="datetimeFigureOut">
               <a:rPr lang="en-US" smtClean="0"/>
-              <a:t>3/26/2014</a:t>
+              <a:t>6/11/2015</a:t>
             </a:fld>
             <a:endParaRPr lang="en-US"/>
           </a:p>
@@ -3200,7 +3200,7 @@
           <a:p>
             <a:fld id="{699DC775-C286-4358-8C92-D7E584E969B3}" type="datetimeFigureOut">
               <a:rPr lang="en-US" smtClean="0"/>
-              <a:t>3/26/2014</a:t>
+              <a:t>6/11/2015</a:t>
             </a:fld>
             <a:endParaRPr lang="en-US"/>
           </a:p>
@@ -3370,7 +3370,7 @@
           <a:p>
             <a:fld id="{699DC775-C286-4358-8C92-D7E584E969B3}" type="datetimeFigureOut">
               <a:rPr lang="en-US" smtClean="0"/>
-              <a:t>3/26/2014</a:t>
+              <a:t>6/11/2015</a:t>
             </a:fld>
             <a:endParaRPr lang="en-US"/>
           </a:p>
@@ -3623,7 +3623,7 @@
           <a:p>
             <a:fld id="{699DC775-C286-4358-8C92-D7E584E969B3}" type="datetimeFigureOut">
               <a:rPr lang="en-US" smtClean="0"/>
-              <a:t>3/26/2014</a:t>
+              <a:t>6/11/2015</a:t>
             </a:fld>
             <a:endParaRPr lang="en-US"/>
           </a:p>
@@ -3793,7 +3793,7 @@
           <a:p>
             <a:fld id="{699DC775-C286-4358-8C92-D7E584E969B3}" type="datetimeFigureOut">
               <a:rPr lang="en-US" smtClean="0"/>
-              <a:t>3/26/2014</a:t>
+              <a:t>6/11/2015</a:t>
             </a:fld>
             <a:endParaRPr lang="en-US"/>
           </a:p>
@@ -3973,7 +3973,7 @@
           <a:p>
             <a:fld id="{699DC775-C286-4358-8C92-D7E584E969B3}" type="datetimeFigureOut">
               <a:rPr lang="en-US" smtClean="0"/>
-              <a:t>3/26/2014</a:t>
+              <a:t>6/11/2015</a:t>
             </a:fld>
             <a:endParaRPr lang="en-US"/>
           </a:p>
@@ -4223,7 +4223,7 @@
           <a:p>
             <a:fld id="{699DC775-C286-4358-8C92-D7E584E969B3}" type="datetimeFigureOut">
               <a:rPr lang="en-US" smtClean="0"/>
-              <a:t>3/26/2014</a:t>
+              <a:t>6/11/2015</a:t>
             </a:fld>
             <a:endParaRPr lang="en-US"/>
           </a:p>
@@ -4401,7 +4401,7 @@
           <a:p>
             <a:fld id="{699DC775-C286-4358-8C92-D7E584E969B3}" type="datetimeFigureOut">
               <a:rPr lang="en-US" smtClean="0"/>
-              <a:t>3/26/2014</a:t>
+              <a:t>6/11/2015</a:t>
             </a:fld>
             <a:endParaRPr lang="en-US"/>
           </a:p>
@@ -4655,7 +4655,7 @@
           <a:p>
             <a:fld id="{699DC775-C286-4358-8C92-D7E584E969B3}" type="datetimeFigureOut">
               <a:rPr lang="en-US" smtClean="0"/>
-              <a:t>3/26/2014</a:t>
+              <a:t>6/11/2015</a:t>
             </a:fld>
             <a:endParaRPr lang="en-US"/>
           </a:p>
@@ -4951,7 +4951,7 @@
           <a:p>
             <a:fld id="{699DC775-C286-4358-8C92-D7E584E969B3}" type="datetimeFigureOut">
               <a:rPr lang="en-US" smtClean="0"/>
-              <a:t>3/26/2014</a:t>
+              <a:t>6/11/2015</a:t>
             </a:fld>
             <a:endParaRPr lang="en-US"/>
           </a:p>
@@ -5381,7 +5381,7 @@
           <a:p>
             <a:fld id="{699DC775-C286-4358-8C92-D7E584E969B3}" type="datetimeFigureOut">
               <a:rPr lang="en-US" smtClean="0"/>
-              <a:t>3/26/2014</a:t>
+              <a:t>6/11/2015</a:t>
             </a:fld>
             <a:endParaRPr lang="en-US"/>
           </a:p>
@@ -5507,7 +5507,7 @@
           <a:p>
             <a:fld id="{699DC775-C286-4358-8C92-D7E584E969B3}" type="datetimeFigureOut">
               <a:rPr lang="en-US" smtClean="0"/>
-              <a:t>3/26/2014</a:t>
+              <a:t>6/11/2015</a:t>
             </a:fld>
             <a:endParaRPr lang="en-US"/>
           </a:p>
@@ -5610,7 +5610,7 @@
           <a:p>
             <a:fld id="{699DC775-C286-4358-8C92-D7E584E969B3}" type="datetimeFigureOut">
               <a:rPr lang="en-US" smtClean="0"/>
-              <a:t>3/26/2014</a:t>
+              <a:t>6/11/2015</a:t>
             </a:fld>
             <a:endParaRPr lang="en-US"/>
           </a:p>
@@ -5856,7 +5856,7 @@
           <a:p>
             <a:fld id="{699DC775-C286-4358-8C92-D7E584E969B3}" type="datetimeFigureOut">
               <a:rPr lang="en-US" smtClean="0"/>
-              <a:t>3/26/2014</a:t>
+              <a:t>6/11/2015</a:t>
             </a:fld>
             <a:endParaRPr lang="en-US"/>
           </a:p>
@@ -6141,7 +6141,7 @@
           <a:p>
             <a:fld id="{699DC775-C286-4358-8C92-D7E584E969B3}" type="datetimeFigureOut">
               <a:rPr lang="en-US" smtClean="0"/>
-              <a:t>3/26/2014</a:t>
+              <a:t>6/11/2015</a:t>
             </a:fld>
             <a:endParaRPr lang="en-US"/>
           </a:p>
@@ -6402,7 +6402,7 @@
           <a:p>
             <a:fld id="{699DC775-C286-4358-8C92-D7E584E969B3}" type="datetimeFigureOut">
               <a:rPr lang="en-US" smtClean="0"/>
-              <a:t>3/26/2014</a:t>
+              <a:t>6/11/2015</a:t>
             </a:fld>
             <a:endParaRPr lang="en-US"/>
           </a:p>
@@ -6580,7 +6580,7 @@
           <a:p>
             <a:fld id="{699DC775-C286-4358-8C92-D7E584E969B3}" type="datetimeFigureOut">
               <a:rPr lang="en-US" smtClean="0"/>
-              <a:t>3/26/2014</a:t>
+              <a:t>6/11/2015</a:t>
             </a:fld>
             <a:endParaRPr lang="en-US"/>
           </a:p>
@@ -6768,7 +6768,7 @@
           <a:p>
             <a:fld id="{699DC775-C286-4358-8C92-D7E584E969B3}" type="datetimeFigureOut">
               <a:rPr lang="en-US" smtClean="0"/>
-              <a:t>3/26/2014</a:t>
+              <a:t>6/11/2015</a:t>
             </a:fld>
             <a:endParaRPr lang="en-US"/>
           </a:p>
@@ -7056,7 +7056,7 @@
           <a:p>
             <a:fld id="{699DC775-C286-4358-8C92-D7E584E969B3}" type="datetimeFigureOut">
               <a:rPr lang="en-US" smtClean="0"/>
-              <a:t>3/26/2014</a:t>
+              <a:t>6/11/2015</a:t>
             </a:fld>
             <a:endParaRPr lang="en-US"/>
           </a:p>
@@ -7478,7 +7478,7 @@
           <a:p>
             <a:fld id="{699DC775-C286-4358-8C92-D7E584E969B3}" type="datetimeFigureOut">
               <a:rPr lang="en-US" smtClean="0"/>
-              <a:t>3/26/2014</a:t>
+              <a:t>6/11/2015</a:t>
             </a:fld>
             <a:endParaRPr lang="en-US"/>
           </a:p>
@@ -7596,7 +7596,7 @@
           <a:p>
             <a:fld id="{699DC775-C286-4358-8C92-D7E584E969B3}" type="datetimeFigureOut">
               <a:rPr lang="en-US" smtClean="0"/>
-              <a:t>3/26/2014</a:t>
+              <a:t>6/11/2015</a:t>
             </a:fld>
             <a:endParaRPr lang="en-US"/>
           </a:p>
@@ -7691,7 +7691,7 @@
           <a:p>
             <a:fld id="{699DC775-C286-4358-8C92-D7E584E969B3}" type="datetimeFigureOut">
               <a:rPr lang="en-US" smtClean="0"/>
-              <a:t>3/26/2014</a:t>
+              <a:t>6/11/2015</a:t>
             </a:fld>
             <a:endParaRPr lang="en-US"/>
           </a:p>
@@ -7968,7 +7968,7 @@
           <a:p>
             <a:fld id="{699DC775-C286-4358-8C92-D7E584E969B3}" type="datetimeFigureOut">
               <a:rPr lang="en-US" smtClean="0"/>
-              <a:t>3/26/2014</a:t>
+              <a:t>6/11/2015</a:t>
             </a:fld>
             <a:endParaRPr lang="en-US"/>
           </a:p>
@@ -8221,7 +8221,7 @@
           <a:p>
             <a:fld id="{699DC775-C286-4358-8C92-D7E584E969B3}" type="datetimeFigureOut">
               <a:rPr lang="en-US" smtClean="0"/>
-              <a:t>3/26/2014</a:t>
+              <a:t>6/11/2015</a:t>
             </a:fld>
             <a:endParaRPr lang="en-US"/>
           </a:p>
@@ -8434,7 +8434,7 @@
           <a:p>
             <a:fld id="{699DC775-C286-4358-8C92-D7E584E969B3}" type="datetimeFigureOut">
               <a:rPr lang="en-US" smtClean="0"/>
-              <a:t>3/26/2014</a:t>
+              <a:t>6/11/2015</a:t>
             </a:fld>
             <a:endParaRPr lang="en-US"/>
           </a:p>
@@ -8949,7 +8949,7 @@
           <a:p>
             <a:fld id="{699DC775-C286-4358-8C92-D7E584E969B3}" type="datetimeFigureOut">
               <a:rPr lang="en-US" smtClean="0"/>
-              <a:t>3/26/2014</a:t>
+              <a:t>6/11/2015</a:t>
             </a:fld>
             <a:endParaRPr lang="en-US"/>
           </a:p>
@@ -9462,7 +9462,7 @@
           <a:p>
             <a:fld id="{699DC775-C286-4358-8C92-D7E584E969B3}" type="datetimeFigureOut">
               <a:rPr lang="en-US" smtClean="0"/>
-              <a:t>3/26/2014</a:t>
+              <a:t>6/11/2015</a:t>
             </a:fld>
             <a:endParaRPr lang="en-US"/>
           </a:p>
@@ -10080,15 +10080,7 @@
                   <a:schemeClr val="bg1"/>
                 </a:solidFill>
               </a:rPr>
-              <a:t>Auto </a:t>
-            </a:r>
-            <a:r>
-              <a:rPr lang="en-US" sz="7200" dirty="0" smtClean="0">
-                <a:solidFill>
-                  <a:schemeClr val="bg1"/>
-                </a:solidFill>
-              </a:rPr>
-              <a:t>Captions</a:t>
+              <a:t>Auto Captions</a:t>
             </a:r>
             <a:endParaRPr lang="en-SG" sz="7200" dirty="0">
               <a:solidFill>
@@ -10140,58 +10132,21 @@
                   <a:schemeClr val="bg1"/>
                 </a:solidFill>
               </a:rPr>
-              <a:t>Select the slide and click </a:t>
-            </a:r>
+              <a:t>Select the slide and click ‘Auto Captions’ button in the ribbon.</a:t>
+            </a:r>
+          </a:p>
+          <a:p>
+            <a:pPr marL="285750" indent="-285750">
+              <a:buFont typeface="Arial" panose="020B0604020202020204" pitchFamily="34" charset="0"/>
+              <a:buChar char="•"/>
+            </a:pPr>
             <a:r>
               <a:rPr lang="en-US" sz="2400" dirty="0" smtClean="0">
                 <a:solidFill>
                   <a:schemeClr val="bg1"/>
                 </a:solidFill>
               </a:rPr>
-              <a:t>‘Auto Captions’ </a:t>
-            </a:r>
-            <a:r>
-              <a:rPr lang="en-US" sz="2400" dirty="0" smtClean="0">
-                <a:solidFill>
-                  <a:schemeClr val="bg1"/>
-                </a:solidFill>
-              </a:rPr>
-              <a:t>button in the </a:t>
-            </a:r>
-            <a:r>
-              <a:rPr lang="en-US" sz="2400" dirty="0" smtClean="0">
-                <a:solidFill>
-                  <a:schemeClr val="bg1"/>
-                </a:solidFill>
-              </a:rPr>
-              <a:t>ribbon.</a:t>
-            </a:r>
-            <a:endParaRPr lang="en-US" sz="2400" dirty="0" smtClean="0">
-              <a:solidFill>
-                <a:schemeClr val="bg1"/>
-              </a:solidFill>
-            </a:endParaRPr>
-          </a:p>
-          <a:p>
-            <a:pPr marL="285750" indent="-285750">
-              <a:buFont typeface="Arial" panose="020B0604020202020204" pitchFamily="34" charset="0"/>
-              <a:buChar char="•"/>
-            </a:pPr>
-            <a:r>
-              <a:rPr lang="en-US" sz="2400" dirty="0" smtClean="0">
-                <a:solidFill>
-                  <a:schemeClr val="bg1"/>
-                </a:solidFill>
-              </a:rPr>
-              <a:t>Compare the result with the expected output</a:t>
-            </a:r>
-            <a:r>
-              <a:rPr lang="en-US" sz="2400" dirty="0" smtClean="0">
-                <a:solidFill>
-                  <a:schemeClr val="bg1"/>
-                </a:solidFill>
-              </a:rPr>
-              <a:t>.</a:t>
+              <a:t>Compare the result with the expected output.</a:t>
             </a:r>
           </a:p>
           <a:p>
@@ -10283,15 +10238,7 @@
           <a:p>
             <a:r>
               <a:rPr lang="en-US" dirty="0" smtClean="0"/>
-              <a:t>Auto </a:t>
-            </a:r>
-            <a:r>
-              <a:rPr lang="en-US" dirty="0" smtClean="0"/>
-              <a:t>Captions:: </a:t>
-            </a:r>
-            <a:r>
-              <a:rPr lang="en-US" dirty="0" smtClean="0"/>
-              <a:t>normal case</a:t>
+              <a:t>Auto Captions:: normal case</a:t>
             </a:r>
             <a:endParaRPr lang="en-SG" dirty="0"/>
           </a:p>
@@ -11328,14 +11275,14 @@
           <a:p>
             <a:pPr algn="ctr"/>
             <a:r>
-              <a:rPr lang="en-SG" sz="1200" smtClean="0">
+              <a:rPr lang="en-US" altLang="zh-CN" sz="1200" smtClean="0">
                 <a:solidFill>
                   <a:srgbClr val="FFFFFF"/>
                 </a:solidFill>
               </a:rPr>
               <a:t>This is before any click, but after initial animations.</a:t>
             </a:r>
-            <a:endParaRPr lang="en-SG" sz="1200">
+            <a:endParaRPr lang="zh-CN" altLang="en-US" sz="1200">
               <a:solidFill>
                 <a:srgbClr val="FFFFFF"/>
               </a:solidFill>
@@ -11378,14 +11325,14 @@
           <a:p>
             <a:pPr algn="ctr"/>
             <a:r>
-              <a:rPr lang="en-SG" sz="1200" smtClean="0">
+              <a:rPr lang="en-US" altLang="zh-CN" sz="1200" smtClean="0">
                 <a:solidFill>
                   <a:srgbClr val="FFFFFF"/>
                 </a:solidFill>
               </a:rPr>
               <a:t>Here are the first two steps</a:t>
             </a:r>
-            <a:endParaRPr lang="en-SG" sz="1200">
+            <a:endParaRPr lang="zh-CN" altLang="en-US" sz="1200">
               <a:solidFill>
                 <a:srgbClr val="FFFFFF"/>
               </a:solidFill>
@@ -11428,14 +11375,14 @@
           <a:p>
             <a:pPr algn="ctr"/>
             <a:r>
-              <a:rPr lang="en-SG" sz="1200" smtClean="0">
+              <a:rPr lang="en-US" altLang="zh-CN" sz="1200" smtClean="0">
                 <a:solidFill>
                   <a:srgbClr val="FFFFFF"/>
                 </a:solidFill>
               </a:rPr>
               <a:t>Here are the next two steps</a:t>
             </a:r>
-            <a:endParaRPr lang="en-SG" sz="1200">
+            <a:endParaRPr lang="zh-CN" altLang="en-US" sz="1200">
               <a:solidFill>
                 <a:srgbClr val="FFFFFF"/>
               </a:solidFill>
@@ -11478,14 +11425,14 @@
           <a:p>
             <a:pPr algn="ctr"/>
             <a:r>
-              <a:rPr lang="en-SG" sz="1200" smtClean="0">
+              <a:rPr lang="en-US" altLang="zh-CN" sz="1200" smtClean="0">
                 <a:solidFill>
                   <a:srgbClr val="FFFFFF"/>
                 </a:solidFill>
               </a:rPr>
               <a:t>This is the last step.</a:t>
             </a:r>
-            <a:endParaRPr lang="en-SG" sz="1200">
+            <a:endParaRPr lang="zh-CN" altLang="en-US" sz="1200">
               <a:solidFill>
                 <a:srgbClr val="FFFFFF"/>
               </a:solidFill>
@@ -11538,7 +11485,7 @@
     </p:spTree>
     <p:extLst>
       <p:ext uri="{BB962C8B-B14F-4D97-AF65-F5344CB8AC3E}">
-        <p14:creationId xmlns:p14="http://schemas.microsoft.com/office/powerpoint/2010/main" val="1083006482"/>
+        <p14:creationId xmlns:p14="http://schemas.microsoft.com/office/powerpoint/2010/main" val="2196305985"/>
       </p:ext>
     </p:extLst>
   </p:cSld>
@@ -11641,6 +11588,41 @@
                                   </p:childTnLst>
                                 </p:cTn>
                               </p:par>
+                              <p:par>
+                                <p:cTn id="9" presetID="10" presetClass="entr" presetSubtype="0" fill="hold" grpId="0" nodeType="withEffect">
+                                  <p:stCondLst>
+                                    <p:cond delay="0"/>
+                                  </p:stCondLst>
+                                  <p:childTnLst>
+                                    <p:set>
+                                      <p:cBhvr>
+                                        <p:cTn id="10" dur="1" fill="hold">
+                                          <p:stCondLst>
+                                            <p:cond delay="0"/>
+                                          </p:stCondLst>
+                                        </p:cTn>
+                                        <p:tgtEl>
+                                          <p:spTgt spid="2"/>
+                                        </p:tgtEl>
+                                        <p:attrNameLst>
+                                          <p:attrName>style.visibility</p:attrName>
+                                        </p:attrNameLst>
+                                      </p:cBhvr>
+                                      <p:to>
+                                        <p:strVal val="visible"/>
+                                      </p:to>
+                                    </p:set>
+                                    <p:animEffect transition="in" filter="fade">
+                                      <p:cBhvr>
+                                        <p:cTn id="11" dur="500"/>
+                                        <p:tgtEl>
+                                          <p:spTgt spid="2"/>
+                                        </p:tgtEl>
+                                      </p:cBhvr>
+                                    </p:animEffect>
+                                  </p:childTnLst>
+                                </p:cTn>
+                              </p:par>
                             </p:childTnLst>
                           </p:cTn>
                         </p:par>
@@ -11648,26 +11630,26 @@
                     </p:cTn>
                   </p:par>
                   <p:par>
-                    <p:cTn id="9" fill="hold">
+                    <p:cTn id="12" fill="hold">
                       <p:stCondLst>
                         <p:cond delay="indefinite"/>
                       </p:stCondLst>
                       <p:childTnLst>
                         <p:par>
-                          <p:cTn id="10" fill="hold">
+                          <p:cTn id="13" fill="hold">
                             <p:stCondLst>
                               <p:cond delay="0"/>
                             </p:stCondLst>
                             <p:childTnLst>
                               <p:par>
-                                <p:cTn id="11" presetID="1" presetClass="entr" presetSubtype="0" fill="hold" grpId="0" nodeType="clickEffect">
+                                <p:cTn id="14" presetID="1" presetClass="entr" presetSubtype="0" fill="hold" grpId="0" nodeType="clickEffect">
                                   <p:stCondLst>
                                     <p:cond delay="0"/>
                                   </p:stCondLst>
                                   <p:childTnLst>
                                     <p:set>
                                       <p:cBhvr>
-                                        <p:cTn id="12" dur="1" fill="hold">
+                                        <p:cTn id="15" dur="1" fill="hold">
                                           <p:stCondLst>
                                             <p:cond delay="499"/>
                                           </p:stCondLst>
@@ -11690,20 +11672,20 @@
                           </p:cTn>
                         </p:par>
                         <p:par>
-                          <p:cTn id="13" fill="hold">
+                          <p:cTn id="16" fill="hold">
                             <p:stCondLst>
                               <p:cond delay="500"/>
                             </p:stCondLst>
                             <p:childTnLst>
                               <p:par>
-                                <p:cTn id="14" presetID="1" presetClass="entr" presetSubtype="0" fill="hold" grpId="0" nodeType="afterEffect">
+                                <p:cTn id="17" presetID="1" presetClass="entr" presetSubtype="0" fill="hold" grpId="0" nodeType="afterEffect">
                                   <p:stCondLst>
                                     <p:cond delay="0"/>
                                   </p:stCondLst>
                                   <p:childTnLst>
                                     <p:set>
                                       <p:cBhvr>
-                                        <p:cTn id="15" dur="1" fill="hold">
+                                        <p:cTn id="18" dur="1" fill="hold">
                                           <p:stCondLst>
                                             <p:cond delay="499"/>
                                           </p:stCondLst>
@@ -11723,14 +11705,14 @@
                                 </p:cTn>
                               </p:par>
                               <p:par>
-                                <p:cTn id="16" presetID="1" presetClass="entr" presetSubtype="0" fill="hold" grpId="0" nodeType="withEffect">
+                                <p:cTn id="19" presetID="1" presetClass="entr" presetSubtype="0" fill="hold" grpId="0" nodeType="withEffect">
                                   <p:stCondLst>
                                     <p:cond delay="0"/>
                                   </p:stCondLst>
                                   <p:childTnLst>
                                     <p:set>
                                       <p:cBhvr>
-                                        <p:cTn id="17" dur="1" fill="hold">
+                                        <p:cTn id="20" dur="1" fill="hold">
                                           <p:stCondLst>
                                             <p:cond delay="0"/>
                                           </p:stCondLst>
@@ -11750,14 +11732,14 @@
                                 </p:cTn>
                               </p:par>
                               <p:par>
-                                <p:cTn id="18" presetID="1" presetClass="exit" presetSubtype="0" fill="hold" grpId="0" nodeType="withEffect">
+                                <p:cTn id="21" presetID="1" presetClass="exit" presetSubtype="0" fill="hold" grpId="1" nodeType="withEffect">
                                   <p:stCondLst>
                                     <p:cond delay="0"/>
                                   </p:stCondLst>
                                   <p:childTnLst>
                                     <p:set>
                                       <p:cBhvr>
-                                        <p:cTn id="19" dur="1" fill="hold">
+                                        <p:cTn id="22" dur="1" fill="hold">
                                           <p:stCondLst>
                                             <p:cond delay="0"/>
                                           </p:stCondLst>
@@ -11783,26 +11765,26 @@
                     </p:cTn>
                   </p:par>
                   <p:par>
-                    <p:cTn id="20" fill="hold">
+                    <p:cTn id="23" fill="hold">
                       <p:stCondLst>
                         <p:cond delay="indefinite"/>
                       </p:stCondLst>
                       <p:childTnLst>
                         <p:par>
-                          <p:cTn id="21" fill="hold">
+                          <p:cTn id="24" fill="hold">
                             <p:stCondLst>
                               <p:cond delay="0"/>
                             </p:stCondLst>
                             <p:childTnLst>
                               <p:par>
-                                <p:cTn id="22" presetID="1" presetClass="entr" presetSubtype="0" fill="hold" grpId="0" nodeType="clickEffect">
+                                <p:cTn id="25" presetID="1" presetClass="entr" presetSubtype="0" fill="hold" grpId="0" nodeType="clickEffect">
                                   <p:stCondLst>
                                     <p:cond delay="0"/>
                                   </p:stCondLst>
                                   <p:childTnLst>
                                     <p:set>
                                       <p:cBhvr>
-                                        <p:cTn id="23" dur="1" fill="hold">
+                                        <p:cTn id="26" dur="1" fill="hold">
                                           <p:stCondLst>
                                             <p:cond delay="499"/>
                                           </p:stCondLst>
@@ -11825,20 +11807,20 @@
                           </p:cTn>
                         </p:par>
                         <p:par>
-                          <p:cTn id="24" fill="hold">
+                          <p:cTn id="27" fill="hold">
                             <p:stCondLst>
                               <p:cond delay="500"/>
                             </p:stCondLst>
                             <p:childTnLst>
                               <p:par>
-                                <p:cTn id="25" presetID="1" presetClass="entr" presetSubtype="0" fill="hold" grpId="0" nodeType="afterEffect">
+                                <p:cTn id="28" presetID="1" presetClass="entr" presetSubtype="0" fill="hold" grpId="0" nodeType="afterEffect">
                                   <p:stCondLst>
                                     <p:cond delay="0"/>
                                   </p:stCondLst>
                                   <p:childTnLst>
                                     <p:set>
                                       <p:cBhvr>
-                                        <p:cTn id="26" dur="1" fill="hold">
+                                        <p:cTn id="29" dur="1" fill="hold">
                                           <p:stCondLst>
                                             <p:cond delay="499"/>
                                           </p:stCondLst>
@@ -11858,14 +11840,14 @@
                                 </p:cTn>
                               </p:par>
                               <p:par>
-                                <p:cTn id="27" presetID="1" presetClass="entr" presetSubtype="0" fill="hold" grpId="0" nodeType="withEffect">
+                                <p:cTn id="30" presetID="1" presetClass="entr" presetSubtype="0" fill="hold" grpId="0" nodeType="withEffect">
                                   <p:stCondLst>
                                     <p:cond delay="0"/>
                                   </p:stCondLst>
                                   <p:childTnLst>
                                     <p:set>
                                       <p:cBhvr>
-                                        <p:cTn id="28" dur="1" fill="hold">
+                                        <p:cTn id="31" dur="1" fill="hold">
                                           <p:stCondLst>
                                             <p:cond delay="0"/>
                                           </p:stCondLst>
@@ -11885,14 +11867,14 @@
                                 </p:cTn>
                               </p:par>
                               <p:par>
-                                <p:cTn id="29" presetID="1" presetClass="exit" presetSubtype="0" fill="hold" grpId="1" nodeType="withEffect">
+                                <p:cTn id="32" presetID="1" presetClass="exit" presetSubtype="0" fill="hold" grpId="1" nodeType="withEffect">
                                   <p:stCondLst>
                                     <p:cond delay="0"/>
                                   </p:stCondLst>
                                   <p:childTnLst>
                                     <p:set>
                                       <p:cBhvr>
-                                        <p:cTn id="30" dur="1" fill="hold">
+                                        <p:cTn id="33" dur="1" fill="hold">
                                           <p:stCondLst>
                                             <p:cond delay="0"/>
                                           </p:stCondLst>
@@ -11918,26 +11900,26 @@
                     </p:cTn>
                   </p:par>
                   <p:par>
-                    <p:cTn id="31" fill="hold">
+                    <p:cTn id="34" fill="hold">
                       <p:stCondLst>
                         <p:cond delay="indefinite"/>
                       </p:stCondLst>
                       <p:childTnLst>
                         <p:par>
-                          <p:cTn id="32" fill="hold">
+                          <p:cTn id="35" fill="hold">
                             <p:stCondLst>
                               <p:cond delay="0"/>
                             </p:stCondLst>
                             <p:childTnLst>
                               <p:par>
-                                <p:cTn id="33" presetID="2" presetClass="entr" presetSubtype="4" fill="hold" grpId="0" nodeType="clickEffect">
+                                <p:cTn id="36" presetID="2" presetClass="entr" presetSubtype="4" fill="hold" grpId="0" nodeType="clickEffect">
                                   <p:stCondLst>
                                     <p:cond delay="0"/>
                                   </p:stCondLst>
                                   <p:childTnLst>
                                     <p:set>
                                       <p:cBhvr>
-                                        <p:cTn id="34" dur="1" fill="hold">
+                                        <p:cTn id="37" dur="1" fill="hold">
                                           <p:stCondLst>
                                             <p:cond delay="0"/>
                                           </p:stCondLst>
@@ -11955,7 +11937,7 @@
                                     </p:set>
                                     <p:anim calcmode="lin" valueType="num">
                                       <p:cBhvr additive="base">
-                                        <p:cTn id="35" dur="500" fill="hold"/>
+                                        <p:cTn id="38" dur="500" fill="hold"/>
                                         <p:tgtEl>
                                           <p:spTgt spid="13"/>
                                         </p:tgtEl>
@@ -11978,7 +11960,7 @@
                                     </p:anim>
                                     <p:anim calcmode="lin" valueType="num">
                                       <p:cBhvr additive="base">
-                                        <p:cTn id="36" dur="500" fill="hold"/>
+                                        <p:cTn id="39" dur="500" fill="hold"/>
                                         <p:tgtEl>
                                           <p:spTgt spid="13"/>
                                         </p:tgtEl>
@@ -12003,14 +11985,14 @@
                                 </p:cTn>
                               </p:par>
                               <p:par>
-                                <p:cTn id="37" presetID="1" presetClass="entr" presetSubtype="0" fill="hold" grpId="0" nodeType="withEffect">
+                                <p:cTn id="40" presetID="1" presetClass="entr" presetSubtype="0" fill="hold" grpId="0" nodeType="withEffect">
                                   <p:stCondLst>
                                     <p:cond delay="0"/>
                                   </p:stCondLst>
                                   <p:childTnLst>
                                     <p:set>
                                       <p:cBhvr>
-                                        <p:cTn id="38" dur="1" fill="hold">
+                                        <p:cTn id="41" dur="1" fill="hold">
                                           <p:stCondLst>
                                             <p:cond delay="0"/>
                                           </p:stCondLst>
@@ -12030,14 +12012,14 @@
                                 </p:cTn>
                               </p:par>
                               <p:par>
-                                <p:cTn id="39" presetID="1" presetClass="exit" presetSubtype="0" fill="hold" grpId="1" nodeType="withEffect">
+                                <p:cTn id="42" presetID="1" presetClass="exit" presetSubtype="0" fill="hold" grpId="1" nodeType="withEffect">
                                   <p:stCondLst>
                                     <p:cond delay="0"/>
                                   </p:stCondLst>
                                   <p:childTnLst>
                                     <p:set>
                                       <p:cBhvr>
-                                        <p:cTn id="40" dur="1" fill="hold">
+                                        <p:cTn id="43" dur="1" fill="hold">
                                           <p:stCondLst>
                                             <p:cond delay="0"/>
                                           </p:stCondLst>
@@ -12057,14 +12039,14 @@
                                 </p:cTn>
                               </p:par>
                               <p:par>
-                                <p:cTn id="41" presetID="10" presetClass="exit" presetSubtype="0" fill="hold" grpId="0" nodeType="withEffect">
+                                <p:cTn id="44" presetID="10" presetClass="exit" presetSubtype="0" fill="hold" grpId="0" nodeType="withEffect">
                                   <p:stCondLst>
                                     <p:cond delay="0"/>
                                   </p:stCondLst>
                                   <p:childTnLst>
                                     <p:animEffect transition="out" filter="fade">
                                       <p:cBhvr>
-                                        <p:cTn id="42" dur="500"/>
+                                        <p:cTn id="45" dur="500"/>
                                         <p:tgtEl>
                                           <p:spTgt spid="12"/>
                                         </p:tgtEl>
@@ -12072,7 +12054,7 @@
                                     </p:animEffect>
                                     <p:set>
                                       <p:cBhvr>
-                                        <p:cTn id="43" dur="1" fill="hold">
+                                        <p:cTn id="46" dur="1" fill="hold">
                                           <p:stCondLst>
                                             <p:cond delay="499"/>
                                           </p:stCondLst>
@@ -12126,6 +12108,7 @@
       <p:bldP spid="13" grpId="0" animBg="1" autoUpdateAnimBg="0"/>
       <p:bldP spid="20" grpId="0" animBg="1" autoUpdateAnimBg="0"/>
       <p:bldP spid="2" grpId="0" animBg="1"/>
+      <p:bldP spid="2" grpId="1" animBg="1"/>
       <p:bldP spid="3" grpId="0" animBg="1"/>
       <p:bldP spid="3" grpId="1" animBg="1"/>
       <p:bldP spid="8" grpId="0" animBg="1"/>

</xml_diff>

<commit_message>
Add test for error message when slides selected have no notes
</commit_message>
<xml_diff>
--- a/doc/test/AutoCaptions.pptx
+++ b/doc/test/AutoCaptions.pptx
@@ -7,7 +7,7 @@
     <p:sldMasterId id="2147483672" r:id="rId3"/>
   </p:sldMasterIdLst>
   <p:notesMasterIdLst>
-    <p:notesMasterId r:id="rId10"/>
+    <p:notesMasterId r:id="rId11"/>
   </p:notesMasterIdLst>
   <p:sldIdLst>
     <p:sldId id="287" r:id="rId4"/>
@@ -15,7 +15,8 @@
     <p:sldId id="292" r:id="rId6"/>
     <p:sldId id="294" r:id="rId7"/>
     <p:sldId id="296" r:id="rId8"/>
-    <p:sldId id="274" r:id="rId9"/>
+    <p:sldId id="297" r:id="rId9"/>
+    <p:sldId id="274" r:id="rId10"/>
   </p:sldIdLst>
   <p:sldSz cx="9144000" cy="6858000" type="screen4x3"/>
   <p:notesSz cx="6858000" cy="9144000"/>
@@ -128,6 +129,7 @@
             <p14:sldId id="292"/>
             <p14:sldId id="294"/>
             <p14:sldId id="296"/>
+            <p14:sldId id="297"/>
             <p14:sldId id="274"/>
           </p14:sldIdLst>
         </p14:section>
@@ -233,7 +235,7 @@
           <a:p>
             <a:fld id="{26004F41-C1A1-4B0D-9EEE-5E3F0E5BC108}" type="datetimeFigureOut">
               <a:rPr lang="en-SG" smtClean="0"/>
-              <a:t>11/6/2015</a:t>
+              <a:t>7/4/2017</a:t>
             </a:fld>
             <a:endParaRPr lang="en-SG"/>
           </a:p>
@@ -545,6 +547,90 @@
           <a:bodyPr/>
           <a:lstStyle/>
           <a:p>
+            <a:endParaRPr lang="en-SG" dirty="0"/>
+          </a:p>
+        </p:txBody>
+      </p:sp>
+      <p:sp>
+        <p:nvSpPr>
+          <p:cNvPr id="4" name="Slide Number Placeholder 3"/>
+          <p:cNvSpPr>
+            <a:spLocks noGrp="1"/>
+          </p:cNvSpPr>
+          <p:nvPr>
+            <p:ph type="sldNum" sz="quarter" idx="10"/>
+          </p:nvPr>
+        </p:nvSpPr>
+        <p:spPr/>
+        <p:txBody>
+          <a:bodyPr/>
+          <a:lstStyle/>
+          <a:p>
+            <a:fld id="{E96FB07A-B1AD-4238-A6C9-967239C45D18}" type="slidenum">
+              <a:rPr lang="en-SG" smtClean="0"/>
+              <a:t>3</a:t>
+            </a:fld>
+            <a:endParaRPr lang="en-SG"/>
+          </a:p>
+        </p:txBody>
+      </p:sp>
+    </p:spTree>
+    <p:extLst>
+      <p:ext uri="{BB962C8B-B14F-4D97-AF65-F5344CB8AC3E}">
+        <p14:creationId xmlns:p14="http://schemas.microsoft.com/office/powerpoint/2010/main" val="3992610653"/>
+      </p:ext>
+    </p:extLst>
+  </p:cSld>
+  <p:clrMapOvr>
+    <a:masterClrMapping/>
+  </p:clrMapOvr>
+</p:notes>
+</file>
+
+<file path=ppt/notesSlides/notesSlide2.xml><?xml version="1.0" encoding="utf-8"?>
+<p:notes xmlns:a="http://schemas.openxmlformats.org/drawingml/2006/main" xmlns:r="http://schemas.openxmlformats.org/officeDocument/2006/relationships" xmlns:p="http://schemas.openxmlformats.org/presentationml/2006/main">
+  <p:cSld>
+    <p:spTree>
+      <p:nvGrpSpPr>
+        <p:cNvPr id="1" name=""/>
+        <p:cNvGrpSpPr/>
+        <p:nvPr/>
+      </p:nvGrpSpPr>
+      <p:grpSpPr>
+        <a:xfrm>
+          <a:off x="0" y="0"/>
+          <a:ext cx="0" cy="0"/>
+          <a:chOff x="0" y="0"/>
+          <a:chExt cx="0" cy="0"/>
+        </a:xfrm>
+      </p:grpSpPr>
+      <p:sp>
+        <p:nvSpPr>
+          <p:cNvPr id="2" name="Slide Image Placeholder 1"/>
+          <p:cNvSpPr>
+            <a:spLocks noGrp="1" noRot="1" noChangeAspect="1"/>
+          </p:cNvSpPr>
+          <p:nvPr>
+            <p:ph type="sldImg"/>
+          </p:nvPr>
+        </p:nvSpPr>
+        <p:spPr/>
+      </p:sp>
+      <p:sp>
+        <p:nvSpPr>
+          <p:cNvPr id="3" name="Notes Placeholder 2"/>
+          <p:cNvSpPr>
+            <a:spLocks noGrp="1"/>
+          </p:cNvSpPr>
+          <p:nvPr>
+            <p:ph type="body" idx="1"/>
+          </p:nvPr>
+        </p:nvSpPr>
+        <p:spPr/>
+        <p:txBody>
+          <a:bodyPr/>
+          <a:lstStyle/>
+          <a:p>
             <a:r>
               <a:rPr lang="en-US" dirty="0" smtClean="0"/>
               <a:t>This is before any click, but after initial animations.</a:t>
@@ -656,7 +742,7 @@
 </p:notes>
 </file>
 
-<file path=ppt/notesSlides/notesSlide2.xml><?xml version="1.0" encoding="utf-8"?>
+<file path=ppt/notesSlides/notesSlide3.xml><?xml version="1.0" encoding="utf-8"?>
 <p:notes xmlns:a="http://schemas.openxmlformats.org/drawingml/2006/main" xmlns:r="http://schemas.openxmlformats.org/officeDocument/2006/relationships" xmlns:p="http://schemas.openxmlformats.org/presentationml/2006/main">
   <p:cSld>
     <p:spTree>
@@ -992,7 +1078,7 @@
           <a:p>
             <a:fld id="{699DC775-C286-4358-8C92-D7E584E969B3}" type="datetimeFigureOut">
               <a:rPr lang="en-US" smtClean="0"/>
-              <a:t>6/11/2015</a:t>
+              <a:t>4/7/2017</a:t>
             </a:fld>
             <a:endParaRPr lang="en-US"/>
           </a:p>
@@ -1162,7 +1248,7 @@
           <a:p>
             <a:fld id="{699DC775-C286-4358-8C92-D7E584E969B3}" type="datetimeFigureOut">
               <a:rPr lang="en-US" smtClean="0"/>
-              <a:t>6/11/2015</a:t>
+              <a:t>4/7/2017</a:t>
             </a:fld>
             <a:endParaRPr lang="en-US"/>
           </a:p>
@@ -1342,7 +1428,7 @@
           <a:p>
             <a:fld id="{699DC775-C286-4358-8C92-D7E584E969B3}" type="datetimeFigureOut">
               <a:rPr lang="en-US" smtClean="0"/>
-              <a:t>6/11/2015</a:t>
+              <a:t>4/7/2017</a:t>
             </a:fld>
             <a:endParaRPr lang="en-US"/>
           </a:p>
@@ -1584,7 +1670,7 @@
           <a:p>
             <a:fld id="{699DC775-C286-4358-8C92-D7E584E969B3}" type="datetimeFigureOut">
               <a:rPr lang="en-US" smtClean="0"/>
-              <a:t>6/11/2015</a:t>
+              <a:t>4/7/2017</a:t>
             </a:fld>
             <a:endParaRPr lang="en-US"/>
           </a:p>
@@ -1754,7 +1840,7 @@
           <a:p>
             <a:fld id="{699DC775-C286-4358-8C92-D7E584E969B3}" type="datetimeFigureOut">
               <a:rPr lang="en-US" smtClean="0"/>
-              <a:t>6/11/2015</a:t>
+              <a:t>4/7/2017</a:t>
             </a:fld>
             <a:endParaRPr lang="en-US"/>
           </a:p>
@@ -2000,7 +2086,7 @@
           <a:p>
             <a:fld id="{699DC775-C286-4358-8C92-D7E584E969B3}" type="datetimeFigureOut">
               <a:rPr lang="en-US" smtClean="0"/>
-              <a:t>6/11/2015</a:t>
+              <a:t>4/7/2017</a:t>
             </a:fld>
             <a:endParaRPr lang="en-US"/>
           </a:p>
@@ -2288,7 +2374,7 @@
           <a:p>
             <a:fld id="{699DC775-C286-4358-8C92-D7E584E969B3}" type="datetimeFigureOut">
               <a:rPr lang="en-US" smtClean="0"/>
-              <a:t>6/11/2015</a:t>
+              <a:t>4/7/2017</a:t>
             </a:fld>
             <a:endParaRPr lang="en-US"/>
           </a:p>
@@ -2710,7 +2796,7 @@
           <a:p>
             <a:fld id="{699DC775-C286-4358-8C92-D7E584E969B3}" type="datetimeFigureOut">
               <a:rPr lang="en-US" smtClean="0"/>
-              <a:t>6/11/2015</a:t>
+              <a:t>4/7/2017</a:t>
             </a:fld>
             <a:endParaRPr lang="en-US"/>
           </a:p>
@@ -2828,7 +2914,7 @@
           <a:p>
             <a:fld id="{699DC775-C286-4358-8C92-D7E584E969B3}" type="datetimeFigureOut">
               <a:rPr lang="en-US" smtClean="0"/>
-              <a:t>6/11/2015</a:t>
+              <a:t>4/7/2017</a:t>
             </a:fld>
             <a:endParaRPr lang="en-US"/>
           </a:p>
@@ -2923,7 +3009,7 @@
           <a:p>
             <a:fld id="{699DC775-C286-4358-8C92-D7E584E969B3}" type="datetimeFigureOut">
               <a:rPr lang="en-US" smtClean="0"/>
-              <a:t>6/11/2015</a:t>
+              <a:t>4/7/2017</a:t>
             </a:fld>
             <a:endParaRPr lang="en-US"/>
           </a:p>
@@ -3200,7 +3286,7 @@
           <a:p>
             <a:fld id="{699DC775-C286-4358-8C92-D7E584E969B3}" type="datetimeFigureOut">
               <a:rPr lang="en-US" smtClean="0"/>
-              <a:t>6/11/2015</a:t>
+              <a:t>4/7/2017</a:t>
             </a:fld>
             <a:endParaRPr lang="en-US"/>
           </a:p>
@@ -3370,7 +3456,7 @@
           <a:p>
             <a:fld id="{699DC775-C286-4358-8C92-D7E584E969B3}" type="datetimeFigureOut">
               <a:rPr lang="en-US" smtClean="0"/>
-              <a:t>6/11/2015</a:t>
+              <a:t>4/7/2017</a:t>
             </a:fld>
             <a:endParaRPr lang="en-US"/>
           </a:p>
@@ -3623,7 +3709,7 @@
           <a:p>
             <a:fld id="{699DC775-C286-4358-8C92-D7E584E969B3}" type="datetimeFigureOut">
               <a:rPr lang="en-US" smtClean="0"/>
-              <a:t>6/11/2015</a:t>
+              <a:t>4/7/2017</a:t>
             </a:fld>
             <a:endParaRPr lang="en-US"/>
           </a:p>
@@ -3793,7 +3879,7 @@
           <a:p>
             <a:fld id="{699DC775-C286-4358-8C92-D7E584E969B3}" type="datetimeFigureOut">
               <a:rPr lang="en-US" smtClean="0"/>
-              <a:t>6/11/2015</a:t>
+              <a:t>4/7/2017</a:t>
             </a:fld>
             <a:endParaRPr lang="en-US"/>
           </a:p>
@@ -3973,7 +4059,7 @@
           <a:p>
             <a:fld id="{699DC775-C286-4358-8C92-D7E584E969B3}" type="datetimeFigureOut">
               <a:rPr lang="en-US" smtClean="0"/>
-              <a:t>6/11/2015</a:t>
+              <a:t>4/7/2017</a:t>
             </a:fld>
             <a:endParaRPr lang="en-US"/>
           </a:p>
@@ -4223,7 +4309,7 @@
           <a:p>
             <a:fld id="{699DC775-C286-4358-8C92-D7E584E969B3}" type="datetimeFigureOut">
               <a:rPr lang="en-US" smtClean="0"/>
-              <a:t>6/11/2015</a:t>
+              <a:t>4/7/2017</a:t>
             </a:fld>
             <a:endParaRPr lang="en-US"/>
           </a:p>
@@ -4401,7 +4487,7 @@
           <a:p>
             <a:fld id="{699DC775-C286-4358-8C92-D7E584E969B3}" type="datetimeFigureOut">
               <a:rPr lang="en-US" smtClean="0"/>
-              <a:t>6/11/2015</a:t>
+              <a:t>4/7/2017</a:t>
             </a:fld>
             <a:endParaRPr lang="en-US"/>
           </a:p>
@@ -4655,7 +4741,7 @@
           <a:p>
             <a:fld id="{699DC775-C286-4358-8C92-D7E584E969B3}" type="datetimeFigureOut">
               <a:rPr lang="en-US" smtClean="0"/>
-              <a:t>6/11/2015</a:t>
+              <a:t>4/7/2017</a:t>
             </a:fld>
             <a:endParaRPr lang="en-US"/>
           </a:p>
@@ -4951,7 +5037,7 @@
           <a:p>
             <a:fld id="{699DC775-C286-4358-8C92-D7E584E969B3}" type="datetimeFigureOut">
               <a:rPr lang="en-US" smtClean="0"/>
-              <a:t>6/11/2015</a:t>
+              <a:t>4/7/2017</a:t>
             </a:fld>
             <a:endParaRPr lang="en-US"/>
           </a:p>
@@ -5381,7 +5467,7 @@
           <a:p>
             <a:fld id="{699DC775-C286-4358-8C92-D7E584E969B3}" type="datetimeFigureOut">
               <a:rPr lang="en-US" smtClean="0"/>
-              <a:t>6/11/2015</a:t>
+              <a:t>4/7/2017</a:t>
             </a:fld>
             <a:endParaRPr lang="en-US"/>
           </a:p>
@@ -5507,7 +5593,7 @@
           <a:p>
             <a:fld id="{699DC775-C286-4358-8C92-D7E584E969B3}" type="datetimeFigureOut">
               <a:rPr lang="en-US" smtClean="0"/>
-              <a:t>6/11/2015</a:t>
+              <a:t>4/7/2017</a:t>
             </a:fld>
             <a:endParaRPr lang="en-US"/>
           </a:p>
@@ -5610,7 +5696,7 @@
           <a:p>
             <a:fld id="{699DC775-C286-4358-8C92-D7E584E969B3}" type="datetimeFigureOut">
               <a:rPr lang="en-US" smtClean="0"/>
-              <a:t>6/11/2015</a:t>
+              <a:t>4/7/2017</a:t>
             </a:fld>
             <a:endParaRPr lang="en-US"/>
           </a:p>
@@ -5856,7 +5942,7 @@
           <a:p>
             <a:fld id="{699DC775-C286-4358-8C92-D7E584E969B3}" type="datetimeFigureOut">
               <a:rPr lang="en-US" smtClean="0"/>
-              <a:t>6/11/2015</a:t>
+              <a:t>4/7/2017</a:t>
             </a:fld>
             <a:endParaRPr lang="en-US"/>
           </a:p>
@@ -6141,7 +6227,7 @@
           <a:p>
             <a:fld id="{699DC775-C286-4358-8C92-D7E584E969B3}" type="datetimeFigureOut">
               <a:rPr lang="en-US" smtClean="0"/>
-              <a:t>6/11/2015</a:t>
+              <a:t>4/7/2017</a:t>
             </a:fld>
             <a:endParaRPr lang="en-US"/>
           </a:p>
@@ -6402,7 +6488,7 @@
           <a:p>
             <a:fld id="{699DC775-C286-4358-8C92-D7E584E969B3}" type="datetimeFigureOut">
               <a:rPr lang="en-US" smtClean="0"/>
-              <a:t>6/11/2015</a:t>
+              <a:t>4/7/2017</a:t>
             </a:fld>
             <a:endParaRPr lang="en-US"/>
           </a:p>
@@ -6580,7 +6666,7 @@
           <a:p>
             <a:fld id="{699DC775-C286-4358-8C92-D7E584E969B3}" type="datetimeFigureOut">
               <a:rPr lang="en-US" smtClean="0"/>
-              <a:t>6/11/2015</a:t>
+              <a:t>4/7/2017</a:t>
             </a:fld>
             <a:endParaRPr lang="en-US"/>
           </a:p>
@@ -6768,7 +6854,7 @@
           <a:p>
             <a:fld id="{699DC775-C286-4358-8C92-D7E584E969B3}" type="datetimeFigureOut">
               <a:rPr lang="en-US" smtClean="0"/>
-              <a:t>6/11/2015</a:t>
+              <a:t>4/7/2017</a:t>
             </a:fld>
             <a:endParaRPr lang="en-US"/>
           </a:p>
@@ -7056,7 +7142,7 @@
           <a:p>
             <a:fld id="{699DC775-C286-4358-8C92-D7E584E969B3}" type="datetimeFigureOut">
               <a:rPr lang="en-US" smtClean="0"/>
-              <a:t>6/11/2015</a:t>
+              <a:t>4/7/2017</a:t>
             </a:fld>
             <a:endParaRPr lang="en-US"/>
           </a:p>
@@ -7478,7 +7564,7 @@
           <a:p>
             <a:fld id="{699DC775-C286-4358-8C92-D7E584E969B3}" type="datetimeFigureOut">
               <a:rPr lang="en-US" smtClean="0"/>
-              <a:t>6/11/2015</a:t>
+              <a:t>4/7/2017</a:t>
             </a:fld>
             <a:endParaRPr lang="en-US"/>
           </a:p>
@@ -7596,7 +7682,7 @@
           <a:p>
             <a:fld id="{699DC775-C286-4358-8C92-D7E584E969B3}" type="datetimeFigureOut">
               <a:rPr lang="en-US" smtClean="0"/>
-              <a:t>6/11/2015</a:t>
+              <a:t>4/7/2017</a:t>
             </a:fld>
             <a:endParaRPr lang="en-US"/>
           </a:p>
@@ -7691,7 +7777,7 @@
           <a:p>
             <a:fld id="{699DC775-C286-4358-8C92-D7E584E969B3}" type="datetimeFigureOut">
               <a:rPr lang="en-US" smtClean="0"/>
-              <a:t>6/11/2015</a:t>
+              <a:t>4/7/2017</a:t>
             </a:fld>
             <a:endParaRPr lang="en-US"/>
           </a:p>
@@ -7968,7 +8054,7 @@
           <a:p>
             <a:fld id="{699DC775-C286-4358-8C92-D7E584E969B3}" type="datetimeFigureOut">
               <a:rPr lang="en-US" smtClean="0"/>
-              <a:t>6/11/2015</a:t>
+              <a:t>4/7/2017</a:t>
             </a:fld>
             <a:endParaRPr lang="en-US"/>
           </a:p>
@@ -8221,7 +8307,7 @@
           <a:p>
             <a:fld id="{699DC775-C286-4358-8C92-D7E584E969B3}" type="datetimeFigureOut">
               <a:rPr lang="en-US" smtClean="0"/>
-              <a:t>6/11/2015</a:t>
+              <a:t>4/7/2017</a:t>
             </a:fld>
             <a:endParaRPr lang="en-US"/>
           </a:p>
@@ -8434,7 +8520,7 @@
           <a:p>
             <a:fld id="{699DC775-C286-4358-8C92-D7E584E969B3}" type="datetimeFigureOut">
               <a:rPr lang="en-US" smtClean="0"/>
-              <a:t>6/11/2015</a:t>
+              <a:t>4/7/2017</a:t>
             </a:fld>
             <a:endParaRPr lang="en-US"/>
           </a:p>
@@ -8949,7 +9035,7 @@
           <a:p>
             <a:fld id="{699DC775-C286-4358-8C92-D7E584E969B3}" type="datetimeFigureOut">
               <a:rPr lang="en-US" smtClean="0"/>
-              <a:t>6/11/2015</a:t>
+              <a:t>4/7/2017</a:t>
             </a:fld>
             <a:endParaRPr lang="en-US"/>
           </a:p>
@@ -9462,7 +9548,7 @@
           <a:p>
             <a:fld id="{699DC775-C286-4358-8C92-D7E584E969B3}" type="datetimeFigureOut">
               <a:rPr lang="en-US" smtClean="0"/>
-              <a:t>6/11/2015</a:t>
+              <a:t>4/7/2017</a:t>
             </a:fld>
             <a:endParaRPr lang="en-US"/>
           </a:p>
@@ -12121,6 +12207,74 @@
 </file>
 
 <file path=ppt/slides/slide6.xml><?xml version="1.0" encoding="utf-8"?>
+<p:sld xmlns:a="http://schemas.openxmlformats.org/drawingml/2006/main" xmlns:r="http://schemas.openxmlformats.org/officeDocument/2006/relationships" xmlns:p="http://schemas.openxmlformats.org/presentationml/2006/main">
+  <p:cSld>
+    <p:spTree>
+      <p:nvGrpSpPr>
+        <p:cNvPr id="1" name=""/>
+        <p:cNvGrpSpPr/>
+        <p:nvPr/>
+      </p:nvGrpSpPr>
+      <p:grpSpPr>
+        <a:xfrm>
+          <a:off x="0" y="0"/>
+          <a:ext cx="0" cy="0"/>
+          <a:chOff x="0" y="0"/>
+          <a:chExt cx="0" cy="0"/>
+        </a:xfrm>
+      </p:grpSpPr>
+      <p:sp>
+        <p:nvSpPr>
+          <p:cNvPr id="2" name="Title 1"/>
+          <p:cNvSpPr>
+            <a:spLocks noGrp="1"/>
+          </p:cNvSpPr>
+          <p:nvPr>
+            <p:ph type="title"/>
+          </p:nvPr>
+        </p:nvSpPr>
+        <p:spPr/>
+        <p:txBody>
+          <a:bodyPr/>
+          <a:lstStyle/>
+          <a:p>
+            <a:r>
+              <a:rPr lang="en-SG" dirty="0" err="1" smtClean="0"/>
+              <a:t>AutoCaptions</a:t>
+            </a:r>
+            <a:r>
+              <a:rPr lang="en-SG" dirty="0" smtClean="0"/>
+              <a:t>::No </a:t>
+            </a:r>
+            <a:r>
+              <a:rPr lang="en-SG" dirty="0" smtClean="0"/>
+              <a:t>caption</a:t>
+            </a:r>
+            <a:endParaRPr lang="en-SG" dirty="0"/>
+          </a:p>
+        </p:txBody>
+      </p:sp>
+    </p:spTree>
+    <p:extLst>
+      <p:ext uri="{BB962C8B-B14F-4D97-AF65-F5344CB8AC3E}">
+        <p14:creationId xmlns:p14="http://schemas.microsoft.com/office/powerpoint/2010/main" val="2487166920"/>
+      </p:ext>
+    </p:extLst>
+  </p:cSld>
+  <p:clrMapOvr>
+    <a:masterClrMapping/>
+  </p:clrMapOvr>
+  <p:timing>
+    <p:tnLst>
+      <p:par>
+        <p:cTn id="1" dur="indefinite" restart="never" nodeType="tmRoot"/>
+      </p:par>
+    </p:tnLst>
+  </p:timing>
+</p:sld>
+</file>
+
+<file path=ppt/slides/slide7.xml><?xml version="1.0" encoding="utf-8"?>
 <p:sld xmlns:a="http://schemas.openxmlformats.org/drawingml/2006/main" xmlns:r="http://schemas.openxmlformats.org/officeDocument/2006/relationships" xmlns:p="http://schemas.openxmlformats.org/presentationml/2006/main" show="0">
   <p:cSld name="PPAck201403240026082737">
     <p:spTree>

</xml_diff>

<commit_message>
Some Captions Lab improvements #1169 (#1170)
* Add helpful messages and open notes pane in captions lab

* Fix ordering of methods

* Add test for error message when slides selected have no notes
</commit_message>
<xml_diff>
--- a/doc/test/AutoCaptions.pptx
+++ b/doc/test/AutoCaptions.pptx
@@ -7,7 +7,7 @@
     <p:sldMasterId id="2147483672" r:id="rId3"/>
   </p:sldMasterIdLst>
   <p:notesMasterIdLst>
-    <p:notesMasterId r:id="rId10"/>
+    <p:notesMasterId r:id="rId11"/>
   </p:notesMasterIdLst>
   <p:sldIdLst>
     <p:sldId id="287" r:id="rId4"/>
@@ -15,7 +15,8 @@
     <p:sldId id="292" r:id="rId6"/>
     <p:sldId id="294" r:id="rId7"/>
     <p:sldId id="296" r:id="rId8"/>
-    <p:sldId id="274" r:id="rId9"/>
+    <p:sldId id="297" r:id="rId9"/>
+    <p:sldId id="274" r:id="rId10"/>
   </p:sldIdLst>
   <p:sldSz cx="9144000" cy="6858000" type="screen4x3"/>
   <p:notesSz cx="6858000" cy="9144000"/>
@@ -128,6 +129,7 @@
             <p14:sldId id="292"/>
             <p14:sldId id="294"/>
             <p14:sldId id="296"/>
+            <p14:sldId id="297"/>
             <p14:sldId id="274"/>
           </p14:sldIdLst>
         </p14:section>
@@ -233,7 +235,7 @@
           <a:p>
             <a:fld id="{26004F41-C1A1-4B0D-9EEE-5E3F0E5BC108}" type="datetimeFigureOut">
               <a:rPr lang="en-SG" smtClean="0"/>
-              <a:t>11/6/2015</a:t>
+              <a:t>7/4/2017</a:t>
             </a:fld>
             <a:endParaRPr lang="en-SG"/>
           </a:p>
@@ -545,6 +547,90 @@
           <a:bodyPr/>
           <a:lstStyle/>
           <a:p>
+            <a:endParaRPr lang="en-SG" dirty="0"/>
+          </a:p>
+        </p:txBody>
+      </p:sp>
+      <p:sp>
+        <p:nvSpPr>
+          <p:cNvPr id="4" name="Slide Number Placeholder 3"/>
+          <p:cNvSpPr>
+            <a:spLocks noGrp="1"/>
+          </p:cNvSpPr>
+          <p:nvPr>
+            <p:ph type="sldNum" sz="quarter" idx="10"/>
+          </p:nvPr>
+        </p:nvSpPr>
+        <p:spPr/>
+        <p:txBody>
+          <a:bodyPr/>
+          <a:lstStyle/>
+          <a:p>
+            <a:fld id="{E96FB07A-B1AD-4238-A6C9-967239C45D18}" type="slidenum">
+              <a:rPr lang="en-SG" smtClean="0"/>
+              <a:t>3</a:t>
+            </a:fld>
+            <a:endParaRPr lang="en-SG"/>
+          </a:p>
+        </p:txBody>
+      </p:sp>
+    </p:spTree>
+    <p:extLst>
+      <p:ext uri="{BB962C8B-B14F-4D97-AF65-F5344CB8AC3E}">
+        <p14:creationId xmlns:p14="http://schemas.microsoft.com/office/powerpoint/2010/main" val="3992610653"/>
+      </p:ext>
+    </p:extLst>
+  </p:cSld>
+  <p:clrMapOvr>
+    <a:masterClrMapping/>
+  </p:clrMapOvr>
+</p:notes>
+</file>
+
+<file path=ppt/notesSlides/notesSlide2.xml><?xml version="1.0" encoding="utf-8"?>
+<p:notes xmlns:a="http://schemas.openxmlformats.org/drawingml/2006/main" xmlns:r="http://schemas.openxmlformats.org/officeDocument/2006/relationships" xmlns:p="http://schemas.openxmlformats.org/presentationml/2006/main">
+  <p:cSld>
+    <p:spTree>
+      <p:nvGrpSpPr>
+        <p:cNvPr id="1" name=""/>
+        <p:cNvGrpSpPr/>
+        <p:nvPr/>
+      </p:nvGrpSpPr>
+      <p:grpSpPr>
+        <a:xfrm>
+          <a:off x="0" y="0"/>
+          <a:ext cx="0" cy="0"/>
+          <a:chOff x="0" y="0"/>
+          <a:chExt cx="0" cy="0"/>
+        </a:xfrm>
+      </p:grpSpPr>
+      <p:sp>
+        <p:nvSpPr>
+          <p:cNvPr id="2" name="Slide Image Placeholder 1"/>
+          <p:cNvSpPr>
+            <a:spLocks noGrp="1" noRot="1" noChangeAspect="1"/>
+          </p:cNvSpPr>
+          <p:nvPr>
+            <p:ph type="sldImg"/>
+          </p:nvPr>
+        </p:nvSpPr>
+        <p:spPr/>
+      </p:sp>
+      <p:sp>
+        <p:nvSpPr>
+          <p:cNvPr id="3" name="Notes Placeholder 2"/>
+          <p:cNvSpPr>
+            <a:spLocks noGrp="1"/>
+          </p:cNvSpPr>
+          <p:nvPr>
+            <p:ph type="body" idx="1"/>
+          </p:nvPr>
+        </p:nvSpPr>
+        <p:spPr/>
+        <p:txBody>
+          <a:bodyPr/>
+          <a:lstStyle/>
+          <a:p>
             <a:r>
               <a:rPr lang="en-US" dirty="0" smtClean="0"/>
               <a:t>This is before any click, but after initial animations.</a:t>
@@ -656,7 +742,7 @@
 </p:notes>
 </file>
 
-<file path=ppt/notesSlides/notesSlide2.xml><?xml version="1.0" encoding="utf-8"?>
+<file path=ppt/notesSlides/notesSlide3.xml><?xml version="1.0" encoding="utf-8"?>
 <p:notes xmlns:a="http://schemas.openxmlformats.org/drawingml/2006/main" xmlns:r="http://schemas.openxmlformats.org/officeDocument/2006/relationships" xmlns:p="http://schemas.openxmlformats.org/presentationml/2006/main">
   <p:cSld>
     <p:spTree>
@@ -992,7 +1078,7 @@
           <a:p>
             <a:fld id="{699DC775-C286-4358-8C92-D7E584E969B3}" type="datetimeFigureOut">
               <a:rPr lang="en-US" smtClean="0"/>
-              <a:t>6/11/2015</a:t>
+              <a:t>4/7/2017</a:t>
             </a:fld>
             <a:endParaRPr lang="en-US"/>
           </a:p>
@@ -1162,7 +1248,7 @@
           <a:p>
             <a:fld id="{699DC775-C286-4358-8C92-D7E584E969B3}" type="datetimeFigureOut">
               <a:rPr lang="en-US" smtClean="0"/>
-              <a:t>6/11/2015</a:t>
+              <a:t>4/7/2017</a:t>
             </a:fld>
             <a:endParaRPr lang="en-US"/>
           </a:p>
@@ -1342,7 +1428,7 @@
           <a:p>
             <a:fld id="{699DC775-C286-4358-8C92-D7E584E969B3}" type="datetimeFigureOut">
               <a:rPr lang="en-US" smtClean="0"/>
-              <a:t>6/11/2015</a:t>
+              <a:t>4/7/2017</a:t>
             </a:fld>
             <a:endParaRPr lang="en-US"/>
           </a:p>
@@ -1584,7 +1670,7 @@
           <a:p>
             <a:fld id="{699DC775-C286-4358-8C92-D7E584E969B3}" type="datetimeFigureOut">
               <a:rPr lang="en-US" smtClean="0"/>
-              <a:t>6/11/2015</a:t>
+              <a:t>4/7/2017</a:t>
             </a:fld>
             <a:endParaRPr lang="en-US"/>
           </a:p>
@@ -1754,7 +1840,7 @@
           <a:p>
             <a:fld id="{699DC775-C286-4358-8C92-D7E584E969B3}" type="datetimeFigureOut">
               <a:rPr lang="en-US" smtClean="0"/>
-              <a:t>6/11/2015</a:t>
+              <a:t>4/7/2017</a:t>
             </a:fld>
             <a:endParaRPr lang="en-US"/>
           </a:p>
@@ -2000,7 +2086,7 @@
           <a:p>
             <a:fld id="{699DC775-C286-4358-8C92-D7E584E969B3}" type="datetimeFigureOut">
               <a:rPr lang="en-US" smtClean="0"/>
-              <a:t>6/11/2015</a:t>
+              <a:t>4/7/2017</a:t>
             </a:fld>
             <a:endParaRPr lang="en-US"/>
           </a:p>
@@ -2288,7 +2374,7 @@
           <a:p>
             <a:fld id="{699DC775-C286-4358-8C92-D7E584E969B3}" type="datetimeFigureOut">
               <a:rPr lang="en-US" smtClean="0"/>
-              <a:t>6/11/2015</a:t>
+              <a:t>4/7/2017</a:t>
             </a:fld>
             <a:endParaRPr lang="en-US"/>
           </a:p>
@@ -2710,7 +2796,7 @@
           <a:p>
             <a:fld id="{699DC775-C286-4358-8C92-D7E584E969B3}" type="datetimeFigureOut">
               <a:rPr lang="en-US" smtClean="0"/>
-              <a:t>6/11/2015</a:t>
+              <a:t>4/7/2017</a:t>
             </a:fld>
             <a:endParaRPr lang="en-US"/>
           </a:p>
@@ -2828,7 +2914,7 @@
           <a:p>
             <a:fld id="{699DC775-C286-4358-8C92-D7E584E969B3}" type="datetimeFigureOut">
               <a:rPr lang="en-US" smtClean="0"/>
-              <a:t>6/11/2015</a:t>
+              <a:t>4/7/2017</a:t>
             </a:fld>
             <a:endParaRPr lang="en-US"/>
           </a:p>
@@ -2923,7 +3009,7 @@
           <a:p>
             <a:fld id="{699DC775-C286-4358-8C92-D7E584E969B3}" type="datetimeFigureOut">
               <a:rPr lang="en-US" smtClean="0"/>
-              <a:t>6/11/2015</a:t>
+              <a:t>4/7/2017</a:t>
             </a:fld>
             <a:endParaRPr lang="en-US"/>
           </a:p>
@@ -3200,7 +3286,7 @@
           <a:p>
             <a:fld id="{699DC775-C286-4358-8C92-D7E584E969B3}" type="datetimeFigureOut">
               <a:rPr lang="en-US" smtClean="0"/>
-              <a:t>6/11/2015</a:t>
+              <a:t>4/7/2017</a:t>
             </a:fld>
             <a:endParaRPr lang="en-US"/>
           </a:p>
@@ -3370,7 +3456,7 @@
           <a:p>
             <a:fld id="{699DC775-C286-4358-8C92-D7E584E969B3}" type="datetimeFigureOut">
               <a:rPr lang="en-US" smtClean="0"/>
-              <a:t>6/11/2015</a:t>
+              <a:t>4/7/2017</a:t>
             </a:fld>
             <a:endParaRPr lang="en-US"/>
           </a:p>
@@ -3623,7 +3709,7 @@
           <a:p>
             <a:fld id="{699DC775-C286-4358-8C92-D7E584E969B3}" type="datetimeFigureOut">
               <a:rPr lang="en-US" smtClean="0"/>
-              <a:t>6/11/2015</a:t>
+              <a:t>4/7/2017</a:t>
             </a:fld>
             <a:endParaRPr lang="en-US"/>
           </a:p>
@@ -3793,7 +3879,7 @@
           <a:p>
             <a:fld id="{699DC775-C286-4358-8C92-D7E584E969B3}" type="datetimeFigureOut">
               <a:rPr lang="en-US" smtClean="0"/>
-              <a:t>6/11/2015</a:t>
+              <a:t>4/7/2017</a:t>
             </a:fld>
             <a:endParaRPr lang="en-US"/>
           </a:p>
@@ -3973,7 +4059,7 @@
           <a:p>
             <a:fld id="{699DC775-C286-4358-8C92-D7E584E969B3}" type="datetimeFigureOut">
               <a:rPr lang="en-US" smtClean="0"/>
-              <a:t>6/11/2015</a:t>
+              <a:t>4/7/2017</a:t>
             </a:fld>
             <a:endParaRPr lang="en-US"/>
           </a:p>
@@ -4223,7 +4309,7 @@
           <a:p>
             <a:fld id="{699DC775-C286-4358-8C92-D7E584E969B3}" type="datetimeFigureOut">
               <a:rPr lang="en-US" smtClean="0"/>
-              <a:t>6/11/2015</a:t>
+              <a:t>4/7/2017</a:t>
             </a:fld>
             <a:endParaRPr lang="en-US"/>
           </a:p>
@@ -4401,7 +4487,7 @@
           <a:p>
             <a:fld id="{699DC775-C286-4358-8C92-D7E584E969B3}" type="datetimeFigureOut">
               <a:rPr lang="en-US" smtClean="0"/>
-              <a:t>6/11/2015</a:t>
+              <a:t>4/7/2017</a:t>
             </a:fld>
             <a:endParaRPr lang="en-US"/>
           </a:p>
@@ -4655,7 +4741,7 @@
           <a:p>
             <a:fld id="{699DC775-C286-4358-8C92-D7E584E969B3}" type="datetimeFigureOut">
               <a:rPr lang="en-US" smtClean="0"/>
-              <a:t>6/11/2015</a:t>
+              <a:t>4/7/2017</a:t>
             </a:fld>
             <a:endParaRPr lang="en-US"/>
           </a:p>
@@ -4951,7 +5037,7 @@
           <a:p>
             <a:fld id="{699DC775-C286-4358-8C92-D7E584E969B3}" type="datetimeFigureOut">
               <a:rPr lang="en-US" smtClean="0"/>
-              <a:t>6/11/2015</a:t>
+              <a:t>4/7/2017</a:t>
             </a:fld>
             <a:endParaRPr lang="en-US"/>
           </a:p>
@@ -5381,7 +5467,7 @@
           <a:p>
             <a:fld id="{699DC775-C286-4358-8C92-D7E584E969B3}" type="datetimeFigureOut">
               <a:rPr lang="en-US" smtClean="0"/>
-              <a:t>6/11/2015</a:t>
+              <a:t>4/7/2017</a:t>
             </a:fld>
             <a:endParaRPr lang="en-US"/>
           </a:p>
@@ -5507,7 +5593,7 @@
           <a:p>
             <a:fld id="{699DC775-C286-4358-8C92-D7E584E969B3}" type="datetimeFigureOut">
               <a:rPr lang="en-US" smtClean="0"/>
-              <a:t>6/11/2015</a:t>
+              <a:t>4/7/2017</a:t>
             </a:fld>
             <a:endParaRPr lang="en-US"/>
           </a:p>
@@ -5610,7 +5696,7 @@
           <a:p>
             <a:fld id="{699DC775-C286-4358-8C92-D7E584E969B3}" type="datetimeFigureOut">
               <a:rPr lang="en-US" smtClean="0"/>
-              <a:t>6/11/2015</a:t>
+              <a:t>4/7/2017</a:t>
             </a:fld>
             <a:endParaRPr lang="en-US"/>
           </a:p>
@@ -5856,7 +5942,7 @@
           <a:p>
             <a:fld id="{699DC775-C286-4358-8C92-D7E584E969B3}" type="datetimeFigureOut">
               <a:rPr lang="en-US" smtClean="0"/>
-              <a:t>6/11/2015</a:t>
+              <a:t>4/7/2017</a:t>
             </a:fld>
             <a:endParaRPr lang="en-US"/>
           </a:p>
@@ -6141,7 +6227,7 @@
           <a:p>
             <a:fld id="{699DC775-C286-4358-8C92-D7E584E969B3}" type="datetimeFigureOut">
               <a:rPr lang="en-US" smtClean="0"/>
-              <a:t>6/11/2015</a:t>
+              <a:t>4/7/2017</a:t>
             </a:fld>
             <a:endParaRPr lang="en-US"/>
           </a:p>
@@ -6402,7 +6488,7 @@
           <a:p>
             <a:fld id="{699DC775-C286-4358-8C92-D7E584E969B3}" type="datetimeFigureOut">
               <a:rPr lang="en-US" smtClean="0"/>
-              <a:t>6/11/2015</a:t>
+              <a:t>4/7/2017</a:t>
             </a:fld>
             <a:endParaRPr lang="en-US"/>
           </a:p>
@@ -6580,7 +6666,7 @@
           <a:p>
             <a:fld id="{699DC775-C286-4358-8C92-D7E584E969B3}" type="datetimeFigureOut">
               <a:rPr lang="en-US" smtClean="0"/>
-              <a:t>6/11/2015</a:t>
+              <a:t>4/7/2017</a:t>
             </a:fld>
             <a:endParaRPr lang="en-US"/>
           </a:p>
@@ -6768,7 +6854,7 @@
           <a:p>
             <a:fld id="{699DC775-C286-4358-8C92-D7E584E969B3}" type="datetimeFigureOut">
               <a:rPr lang="en-US" smtClean="0"/>
-              <a:t>6/11/2015</a:t>
+              <a:t>4/7/2017</a:t>
             </a:fld>
             <a:endParaRPr lang="en-US"/>
           </a:p>
@@ -7056,7 +7142,7 @@
           <a:p>
             <a:fld id="{699DC775-C286-4358-8C92-D7E584E969B3}" type="datetimeFigureOut">
               <a:rPr lang="en-US" smtClean="0"/>
-              <a:t>6/11/2015</a:t>
+              <a:t>4/7/2017</a:t>
             </a:fld>
             <a:endParaRPr lang="en-US"/>
           </a:p>
@@ -7478,7 +7564,7 @@
           <a:p>
             <a:fld id="{699DC775-C286-4358-8C92-D7E584E969B3}" type="datetimeFigureOut">
               <a:rPr lang="en-US" smtClean="0"/>
-              <a:t>6/11/2015</a:t>
+              <a:t>4/7/2017</a:t>
             </a:fld>
             <a:endParaRPr lang="en-US"/>
           </a:p>
@@ -7596,7 +7682,7 @@
           <a:p>
             <a:fld id="{699DC775-C286-4358-8C92-D7E584E969B3}" type="datetimeFigureOut">
               <a:rPr lang="en-US" smtClean="0"/>
-              <a:t>6/11/2015</a:t>
+              <a:t>4/7/2017</a:t>
             </a:fld>
             <a:endParaRPr lang="en-US"/>
           </a:p>
@@ -7691,7 +7777,7 @@
           <a:p>
             <a:fld id="{699DC775-C286-4358-8C92-D7E584E969B3}" type="datetimeFigureOut">
               <a:rPr lang="en-US" smtClean="0"/>
-              <a:t>6/11/2015</a:t>
+              <a:t>4/7/2017</a:t>
             </a:fld>
             <a:endParaRPr lang="en-US"/>
           </a:p>
@@ -7968,7 +8054,7 @@
           <a:p>
             <a:fld id="{699DC775-C286-4358-8C92-D7E584E969B3}" type="datetimeFigureOut">
               <a:rPr lang="en-US" smtClean="0"/>
-              <a:t>6/11/2015</a:t>
+              <a:t>4/7/2017</a:t>
             </a:fld>
             <a:endParaRPr lang="en-US"/>
           </a:p>
@@ -8221,7 +8307,7 @@
           <a:p>
             <a:fld id="{699DC775-C286-4358-8C92-D7E584E969B3}" type="datetimeFigureOut">
               <a:rPr lang="en-US" smtClean="0"/>
-              <a:t>6/11/2015</a:t>
+              <a:t>4/7/2017</a:t>
             </a:fld>
             <a:endParaRPr lang="en-US"/>
           </a:p>
@@ -8434,7 +8520,7 @@
           <a:p>
             <a:fld id="{699DC775-C286-4358-8C92-D7E584E969B3}" type="datetimeFigureOut">
               <a:rPr lang="en-US" smtClean="0"/>
-              <a:t>6/11/2015</a:t>
+              <a:t>4/7/2017</a:t>
             </a:fld>
             <a:endParaRPr lang="en-US"/>
           </a:p>
@@ -8949,7 +9035,7 @@
           <a:p>
             <a:fld id="{699DC775-C286-4358-8C92-D7E584E969B3}" type="datetimeFigureOut">
               <a:rPr lang="en-US" smtClean="0"/>
-              <a:t>6/11/2015</a:t>
+              <a:t>4/7/2017</a:t>
             </a:fld>
             <a:endParaRPr lang="en-US"/>
           </a:p>
@@ -9462,7 +9548,7 @@
           <a:p>
             <a:fld id="{699DC775-C286-4358-8C92-D7E584E969B3}" type="datetimeFigureOut">
               <a:rPr lang="en-US" smtClean="0"/>
-              <a:t>6/11/2015</a:t>
+              <a:t>4/7/2017</a:t>
             </a:fld>
             <a:endParaRPr lang="en-US"/>
           </a:p>
@@ -12121,6 +12207,74 @@
 </file>
 
 <file path=ppt/slides/slide6.xml><?xml version="1.0" encoding="utf-8"?>
+<p:sld xmlns:a="http://schemas.openxmlformats.org/drawingml/2006/main" xmlns:r="http://schemas.openxmlformats.org/officeDocument/2006/relationships" xmlns:p="http://schemas.openxmlformats.org/presentationml/2006/main">
+  <p:cSld>
+    <p:spTree>
+      <p:nvGrpSpPr>
+        <p:cNvPr id="1" name=""/>
+        <p:cNvGrpSpPr/>
+        <p:nvPr/>
+      </p:nvGrpSpPr>
+      <p:grpSpPr>
+        <a:xfrm>
+          <a:off x="0" y="0"/>
+          <a:ext cx="0" cy="0"/>
+          <a:chOff x="0" y="0"/>
+          <a:chExt cx="0" cy="0"/>
+        </a:xfrm>
+      </p:grpSpPr>
+      <p:sp>
+        <p:nvSpPr>
+          <p:cNvPr id="2" name="Title 1"/>
+          <p:cNvSpPr>
+            <a:spLocks noGrp="1"/>
+          </p:cNvSpPr>
+          <p:nvPr>
+            <p:ph type="title"/>
+          </p:nvPr>
+        </p:nvSpPr>
+        <p:spPr/>
+        <p:txBody>
+          <a:bodyPr/>
+          <a:lstStyle/>
+          <a:p>
+            <a:r>
+              <a:rPr lang="en-SG" dirty="0" err="1" smtClean="0"/>
+              <a:t>AutoCaptions</a:t>
+            </a:r>
+            <a:r>
+              <a:rPr lang="en-SG" dirty="0" smtClean="0"/>
+              <a:t>::No </a:t>
+            </a:r>
+            <a:r>
+              <a:rPr lang="en-SG" dirty="0" smtClean="0"/>
+              <a:t>caption</a:t>
+            </a:r>
+            <a:endParaRPr lang="en-SG" dirty="0"/>
+          </a:p>
+        </p:txBody>
+      </p:sp>
+    </p:spTree>
+    <p:extLst>
+      <p:ext uri="{BB962C8B-B14F-4D97-AF65-F5344CB8AC3E}">
+        <p14:creationId xmlns:p14="http://schemas.microsoft.com/office/powerpoint/2010/main" val="2487166920"/>
+      </p:ext>
+    </p:extLst>
+  </p:cSld>
+  <p:clrMapOvr>
+    <a:masterClrMapping/>
+  </p:clrMapOvr>
+  <p:timing>
+    <p:tnLst>
+      <p:par>
+        <p:cTn id="1" dur="indefinite" restart="never" nodeType="tmRoot"/>
+      </p:par>
+    </p:tnLst>
+  </p:timing>
+</p:sld>
+</file>
+
+<file path=ppt/slides/slide7.xml><?xml version="1.0" encoding="utf-8"?>
 <p:sld xmlns:a="http://schemas.openxmlformats.org/drawingml/2006/main" xmlns:r="http://schemas.openxmlformats.org/officeDocument/2006/relationships" xmlns:p="http://schemas.openxmlformats.org/presentationml/2006/main" show="0">
   <p:cSld name="PPAck201403240026082737">
     <p:spTree>

</xml_diff>